<commit_message>
Updating files as described in previous commit.
</commit_message>
<xml_diff>
--- a/Presentation.pptx
+++ b/Presentation.pptx
@@ -268,7 +268,7 @@
           <a:p>
             <a:fld id="{158FD2E7-69BF-4211-91E7-74D297C112D2}" type="datetimeFigureOut">
               <a:rPr lang="en-US" smtClean="0"/>
-              <a:t>12/31/2018</a:t>
+              <a:t>1/3/2019</a:t>
             </a:fld>
             <a:endParaRPr lang="en-US"/>
           </a:p>
@@ -466,7 +466,7 @@
           <a:p>
             <a:fld id="{158FD2E7-69BF-4211-91E7-74D297C112D2}" type="datetimeFigureOut">
               <a:rPr lang="en-US" smtClean="0"/>
-              <a:t>12/31/2018</a:t>
+              <a:t>1/3/2019</a:t>
             </a:fld>
             <a:endParaRPr lang="en-US"/>
           </a:p>
@@ -674,7 +674,7 @@
           <a:p>
             <a:fld id="{158FD2E7-69BF-4211-91E7-74D297C112D2}" type="datetimeFigureOut">
               <a:rPr lang="en-US" smtClean="0"/>
-              <a:t>12/31/2018</a:t>
+              <a:t>1/3/2019</a:t>
             </a:fld>
             <a:endParaRPr lang="en-US"/>
           </a:p>
@@ -872,7 +872,7 @@
           <a:p>
             <a:fld id="{158FD2E7-69BF-4211-91E7-74D297C112D2}" type="datetimeFigureOut">
               <a:rPr lang="en-US" smtClean="0"/>
-              <a:t>12/31/2018</a:t>
+              <a:t>1/3/2019</a:t>
             </a:fld>
             <a:endParaRPr lang="en-US"/>
           </a:p>
@@ -1147,7 +1147,7 @@
           <a:p>
             <a:fld id="{158FD2E7-69BF-4211-91E7-74D297C112D2}" type="datetimeFigureOut">
               <a:rPr lang="en-US" smtClean="0"/>
-              <a:t>12/31/2018</a:t>
+              <a:t>1/3/2019</a:t>
             </a:fld>
             <a:endParaRPr lang="en-US"/>
           </a:p>
@@ -1412,7 +1412,7 @@
           <a:p>
             <a:fld id="{158FD2E7-69BF-4211-91E7-74D297C112D2}" type="datetimeFigureOut">
               <a:rPr lang="en-US" smtClean="0"/>
-              <a:t>12/31/2018</a:t>
+              <a:t>1/3/2019</a:t>
             </a:fld>
             <a:endParaRPr lang="en-US"/>
           </a:p>
@@ -1824,7 +1824,7 @@
           <a:p>
             <a:fld id="{158FD2E7-69BF-4211-91E7-74D297C112D2}" type="datetimeFigureOut">
               <a:rPr lang="en-US" smtClean="0"/>
-              <a:t>12/31/2018</a:t>
+              <a:t>1/3/2019</a:t>
             </a:fld>
             <a:endParaRPr lang="en-US"/>
           </a:p>
@@ -1965,7 +1965,7 @@
           <a:p>
             <a:fld id="{158FD2E7-69BF-4211-91E7-74D297C112D2}" type="datetimeFigureOut">
               <a:rPr lang="en-US" smtClean="0"/>
-              <a:t>12/31/2018</a:t>
+              <a:t>1/3/2019</a:t>
             </a:fld>
             <a:endParaRPr lang="en-US"/>
           </a:p>
@@ -2078,7 +2078,7 @@
           <a:p>
             <a:fld id="{158FD2E7-69BF-4211-91E7-74D297C112D2}" type="datetimeFigureOut">
               <a:rPr lang="en-US" smtClean="0"/>
-              <a:t>12/31/2018</a:t>
+              <a:t>1/3/2019</a:t>
             </a:fld>
             <a:endParaRPr lang="en-US"/>
           </a:p>
@@ -2389,7 +2389,7 @@
           <a:p>
             <a:fld id="{158FD2E7-69BF-4211-91E7-74D297C112D2}" type="datetimeFigureOut">
               <a:rPr lang="en-US" smtClean="0"/>
-              <a:t>12/31/2018</a:t>
+              <a:t>1/3/2019</a:t>
             </a:fld>
             <a:endParaRPr lang="en-US"/>
           </a:p>
@@ -2677,7 +2677,7 @@
           <a:p>
             <a:fld id="{158FD2E7-69BF-4211-91E7-74D297C112D2}" type="datetimeFigureOut">
               <a:rPr lang="en-US" smtClean="0"/>
-              <a:t>12/31/2018</a:t>
+              <a:t>1/3/2019</a:t>
             </a:fld>
             <a:endParaRPr lang="en-US"/>
           </a:p>
@@ -2918,7 +2918,7 @@
           <a:p>
             <a:fld id="{158FD2E7-69BF-4211-91E7-74D297C112D2}" type="datetimeFigureOut">
               <a:rPr lang="en-US" smtClean="0"/>
-              <a:t>12/31/2018</a:t>
+              <a:t>1/3/2019</a:t>
             </a:fld>
             <a:endParaRPr lang="en-US"/>
           </a:p>
@@ -3391,7 +3391,7 @@
           <a:p>
             <a:r>
               <a:rPr lang="en-US" dirty="0"/>
-              <a:t>unique(Consulting Services), LLC</a:t>
+              <a:t>unique(Data Consulting), LLC</a:t>
             </a:r>
           </a:p>
           <a:p>
@@ -3730,6 +3730,42 @@
           </a:p>
         </p:txBody>
       </p:sp>
+      <p:pic>
+        <p:nvPicPr>
+          <p:cNvPr id="7" name="Picture 6" descr="A close up of a logo&#10;&#10;Description automatically generated">
+            <a:extLst>
+              <a:ext uri="{FF2B5EF4-FFF2-40B4-BE49-F238E27FC236}">
+                <a16:creationId xmlns:a16="http://schemas.microsoft.com/office/drawing/2014/main" id="{4F18A481-CD83-4008-8745-35D54043D6E8}"/>
+              </a:ext>
+            </a:extLst>
+          </p:cNvPr>
+          <p:cNvPicPr>
+            <a:picLocks noChangeAspect="1"/>
+          </p:cNvPicPr>
+          <p:nvPr/>
+        </p:nvPicPr>
+        <p:blipFill>
+          <a:blip r:embed="rId4">
+            <a:extLst>
+              <a:ext uri="{28A0092B-C50C-407E-A947-70E740481C1C}">
+                <a14:useLocalDpi xmlns:a14="http://schemas.microsoft.com/office/drawing/2010/main" val="0"/>
+              </a:ext>
+            </a:extLst>
+          </a:blip>
+          <a:stretch>
+            <a:fillRect/>
+          </a:stretch>
+        </p:blipFill>
+        <p:spPr>
+          <a:xfrm>
+            <a:off x="8857785" y="0"/>
+            <a:ext cx="3334215" cy="1905266"/>
+          </a:xfrm>
+          <a:prstGeom prst="rect">
+            <a:avLst/>
+          </a:prstGeom>
+        </p:spPr>
+      </p:pic>
     </p:spTree>
     <p:extLst>
       <p:ext uri="{BB962C8B-B14F-4D97-AF65-F5344CB8AC3E}">
@@ -3746,6 +3782,14 @@
 <file path=ppt/slides/slide10.xml><?xml version="1.0" encoding="utf-8"?>
 <p:sld xmlns:a="http://schemas.openxmlformats.org/drawingml/2006/main" xmlns:r="http://schemas.openxmlformats.org/officeDocument/2006/relationships" xmlns:p="http://schemas.openxmlformats.org/presentationml/2006/main">
   <p:cSld>
+    <p:bg>
+      <p:bgPr>
+        <a:solidFill>
+          <a:schemeClr val="bg1"/>
+        </a:solidFill>
+        <a:effectLst/>
+      </p:bgPr>
+    </p:bg>
     <p:spTree>
       <p:nvGrpSpPr>
         <p:cNvPr id="1" name=""/>
@@ -3776,9 +3820,16 @@
             <p:ph type="title"/>
           </p:nvPr>
         </p:nvSpPr>
-        <p:spPr/>
-        <p:txBody>
-          <a:bodyPr/>
+        <p:spPr>
+          <a:xfrm>
+            <a:off x="1136428" y="627564"/>
+            <a:ext cx="7474172" cy="1325563"/>
+          </a:xfrm>
+        </p:spPr>
+        <p:txBody>
+          <a:bodyPr>
+            <a:normAutofit/>
+          </a:bodyPr>
           <a:lstStyle/>
           <a:p>
             <a:r>
@@ -3804,48 +3855,219 @@
             <p:ph idx="1"/>
           </p:nvPr>
         </p:nvSpPr>
-        <p:spPr/>
-        <p:txBody>
-          <a:bodyPr/>
-          <a:lstStyle/>
-          <a:p>
-            <a:r>
-              <a:rPr lang="en-US" dirty="0">
+        <p:spPr>
+          <a:xfrm>
+            <a:off x="1136429" y="2278173"/>
+            <a:ext cx="6467867" cy="3450613"/>
+          </a:xfrm>
+        </p:spPr>
+        <p:txBody>
+          <a:bodyPr anchor="ctr">
+            <a:normAutofit/>
+          </a:bodyPr>
+          <a:lstStyle/>
+          <a:p>
+            <a:r>
+              <a:rPr lang="en-US" sz="2400">
                 <a:hlinkClick r:id="rId2"/>
               </a:rPr>
               <a:t>GitHub Repository</a:t>
             </a:r>
-            <a:endParaRPr lang="en-US" dirty="0"/>
-          </a:p>
-          <a:p>
-            <a:r>
-              <a:rPr lang="en-US" dirty="0">
+            <a:endParaRPr lang="en-US" sz="2400"/>
+          </a:p>
+          <a:p>
+            <a:r>
+              <a:rPr lang="en-US" sz="2400">
                 <a:hlinkClick r:id="rId3"/>
               </a:rPr>
               <a:t>Codebook</a:t>
             </a:r>
-            <a:endParaRPr lang="en-US" dirty="0"/>
-          </a:p>
-          <a:p>
-            <a:r>
-              <a:rPr lang="en-US" dirty="0">
+            <a:endParaRPr lang="en-US" sz="2400"/>
+          </a:p>
+          <a:p>
+            <a:r>
+              <a:rPr lang="en-US" sz="2400">
                 <a:hlinkClick r:id="rId4"/>
               </a:rPr>
               <a:t>R Markdown File</a:t>
             </a:r>
-            <a:endParaRPr lang="en-US" dirty="0"/>
-          </a:p>
-          <a:p>
-            <a:r>
-              <a:rPr lang="en-US" dirty="0">
+            <a:endParaRPr lang="en-US" sz="2400"/>
+          </a:p>
+          <a:p>
+            <a:r>
+              <a:rPr lang="en-US" sz="2400">
                 <a:hlinkClick r:id="rId5"/>
               </a:rPr>
               <a:t>Data Sources</a:t>
             </a:r>
-            <a:endParaRPr lang="en-US" dirty="0"/>
-          </a:p>
-        </p:txBody>
-      </p:sp>
+            <a:endParaRPr lang="en-US" sz="2400"/>
+          </a:p>
+        </p:txBody>
+      </p:sp>
+      <p:sp>
+        <p:nvSpPr>
+          <p:cNvPr id="10" name="Rectangle 9">
+            <a:extLst>
+              <a:ext uri="{FF2B5EF4-FFF2-40B4-BE49-F238E27FC236}">
+                <a16:creationId xmlns:a16="http://schemas.microsoft.com/office/drawing/2014/main" id="{59A309A7-1751-4ABE-A3C1-EEC40366AD89}"/>
+              </a:ext>
+              <a:ext uri="{C183D7F6-B498-43B3-948B-1728B52AA6E4}">
+                <adec:decorative xmlns:adec="http://schemas.microsoft.com/office/drawing/2017/decorative" val="1"/>
+              </a:ext>
+            </a:extLst>
+          </p:cNvPr>
+          <p:cNvSpPr>
+            <a:spLocks noGrp="1" noRot="1" noChangeAspect="1" noMove="1" noResize="1" noEditPoints="1" noAdjustHandles="1" noChangeArrowheads="1" noChangeShapeType="1" noTextEdit="1"/>
+          </p:cNvSpPr>
+          <p:nvPr>
+            <p:extLst>
+              <p:ext uri="{386F3935-93C4-4BCD-93E2-E3B085C9AB24}">
+                <p16:designElem xmlns:p16="http://schemas.microsoft.com/office/powerpoint/2015/main" val="1"/>
+              </p:ext>
+            </p:extLst>
+          </p:nvPr>
+        </p:nvSpPr>
+        <p:spPr>
+          <a:xfrm>
+            <a:off x="10088880" y="0"/>
+            <a:ext cx="2103120" cy="6858000"/>
+          </a:xfrm>
+          <a:prstGeom prst="rect">
+            <a:avLst/>
+          </a:prstGeom>
+          <a:solidFill>
+            <a:srgbClr val="3A5977"/>
+          </a:solidFill>
+          <a:ln>
+            <a:noFill/>
+          </a:ln>
+        </p:spPr>
+        <p:style>
+          <a:lnRef idx="2">
+            <a:schemeClr val="accent1">
+              <a:shade val="50000"/>
+            </a:schemeClr>
+          </a:lnRef>
+          <a:fillRef idx="1">
+            <a:schemeClr val="accent1"/>
+          </a:fillRef>
+          <a:effectRef idx="0">
+            <a:schemeClr val="accent1"/>
+          </a:effectRef>
+          <a:fontRef idx="minor">
+            <a:schemeClr val="lt1"/>
+          </a:fontRef>
+        </p:style>
+        <p:txBody>
+          <a:bodyPr rtlCol="0" anchor="ctr"/>
+          <a:lstStyle/>
+          <a:p>
+            <a:pPr algn="ctr"/>
+            <a:endParaRPr lang="en-US"/>
+          </a:p>
+        </p:txBody>
+      </p:sp>
+      <p:sp>
+        <p:nvSpPr>
+          <p:cNvPr id="12" name="Oval 11">
+            <a:extLst>
+              <a:ext uri="{FF2B5EF4-FFF2-40B4-BE49-F238E27FC236}">
+                <a16:creationId xmlns:a16="http://schemas.microsoft.com/office/drawing/2014/main" id="{967D8EB6-EAE1-4F9C-B398-83321E287204}"/>
+              </a:ext>
+              <a:ext uri="{C183D7F6-B498-43B3-948B-1728B52AA6E4}">
+                <adec:decorative xmlns:adec="http://schemas.microsoft.com/office/drawing/2017/decorative" val="1"/>
+              </a:ext>
+            </a:extLst>
+          </p:cNvPr>
+          <p:cNvSpPr>
+            <a:spLocks noGrp="1" noRot="1" noChangeAspect="1" noMove="1" noResize="1" noEditPoints="1" noAdjustHandles="1" noChangeArrowheads="1" noChangeShapeType="1" noTextEdit="1"/>
+          </p:cNvSpPr>
+          <p:nvPr>
+            <p:extLst>
+              <p:ext uri="{386F3935-93C4-4BCD-93E2-E3B085C9AB24}">
+                <p16:designElem xmlns:p16="http://schemas.microsoft.com/office/powerpoint/2015/main" val="1"/>
+              </p:ext>
+            </p:extLst>
+          </p:nvPr>
+        </p:nvSpPr>
+        <p:spPr>
+          <a:xfrm>
+            <a:off x="8915400" y="2358913"/>
+            <a:ext cx="2140172" cy="2140172"/>
+          </a:xfrm>
+          <a:prstGeom prst="ellipse">
+            <a:avLst/>
+          </a:prstGeom>
+          <a:solidFill>
+            <a:srgbClr val="FFFFFF"/>
+          </a:solidFill>
+          <a:ln w="22225">
+            <a:solidFill>
+              <a:srgbClr val="FF3E00"/>
+            </a:solidFill>
+          </a:ln>
+        </p:spPr>
+        <p:style>
+          <a:lnRef idx="2">
+            <a:schemeClr val="accent1">
+              <a:shade val="50000"/>
+            </a:schemeClr>
+          </a:lnRef>
+          <a:fillRef idx="1">
+            <a:schemeClr val="accent1"/>
+          </a:fillRef>
+          <a:effectRef idx="0">
+            <a:schemeClr val="accent1"/>
+          </a:effectRef>
+          <a:fontRef idx="minor">
+            <a:schemeClr val="lt1"/>
+          </a:fontRef>
+        </p:style>
+        <p:txBody>
+          <a:bodyPr rtlCol="0" anchor="ctr"/>
+          <a:lstStyle/>
+          <a:p>
+            <a:pPr algn="ctr"/>
+            <a:endParaRPr lang="en-US"/>
+          </a:p>
+        </p:txBody>
+      </p:sp>
+      <p:pic>
+        <p:nvPicPr>
+          <p:cNvPr id="5" name="Picture 4" descr="A close up of a logo&#10;&#10;Description automatically generated">
+            <a:extLst>
+              <a:ext uri="{FF2B5EF4-FFF2-40B4-BE49-F238E27FC236}">
+                <a16:creationId xmlns:a16="http://schemas.microsoft.com/office/drawing/2014/main" id="{3DB82CF5-4316-401E-B960-7793C6D5F55B}"/>
+              </a:ext>
+            </a:extLst>
+          </p:cNvPr>
+          <p:cNvPicPr>
+            <a:picLocks noChangeAspect="1"/>
+          </p:cNvPicPr>
+          <p:nvPr/>
+        </p:nvPicPr>
+        <p:blipFill>
+          <a:blip r:embed="rId6">
+            <a:extLst>
+              <a:ext uri="{28A0092B-C50C-407E-A947-70E740481C1C}">
+                <a14:useLocalDpi xmlns:a14="http://schemas.microsoft.com/office/drawing/2010/main" val="0"/>
+              </a:ext>
+            </a:extLst>
+          </a:blip>
+          <a:stretch>
+            <a:fillRect/>
+          </a:stretch>
+        </p:blipFill>
+        <p:spPr>
+          <a:xfrm>
+            <a:off x="9254442" y="3011261"/>
+            <a:ext cx="1462088" cy="835478"/>
+          </a:xfrm>
+          <a:prstGeom prst="rect">
+            <a:avLst/>
+          </a:prstGeom>
+        </p:spPr>
+      </p:pic>
     </p:spTree>
     <p:extLst>
       <p:ext uri="{BB962C8B-B14F-4D97-AF65-F5344CB8AC3E}">
@@ -3970,6 +4192,36 @@
           </a:p>
         </p:txBody>
       </p:sp>
+      <p:pic>
+        <p:nvPicPr>
+          <p:cNvPr id="4" name="Picture 3">
+            <a:extLst>
+              <a:ext uri="{FF2B5EF4-FFF2-40B4-BE49-F238E27FC236}">
+                <a16:creationId xmlns:a16="http://schemas.microsoft.com/office/drawing/2014/main" id="{E849F654-7315-45BF-8EB3-532F93879FBA}"/>
+              </a:ext>
+            </a:extLst>
+          </p:cNvPr>
+          <p:cNvPicPr>
+            <a:picLocks noChangeAspect="1"/>
+          </p:cNvPicPr>
+          <p:nvPr/>
+        </p:nvPicPr>
+        <p:blipFill>
+          <a:blip r:embed="rId2"/>
+          <a:stretch>
+            <a:fillRect/>
+          </a:stretch>
+        </p:blipFill>
+        <p:spPr>
+          <a:xfrm>
+            <a:off x="8829206" y="0"/>
+            <a:ext cx="3362794" cy="1657581"/>
+          </a:xfrm>
+          <a:prstGeom prst="rect">
+            <a:avLst/>
+          </a:prstGeom>
+        </p:spPr>
+      </p:pic>
     </p:spTree>
     <p:extLst>
       <p:ext uri="{BB962C8B-B14F-4D97-AF65-F5344CB8AC3E}">
@@ -5682,6 +5934,14 @@
 <file path=ppt/slides/slide9.xml><?xml version="1.0" encoding="utf-8"?>
 <p:sld xmlns:a="http://schemas.openxmlformats.org/drawingml/2006/main" xmlns:r="http://schemas.openxmlformats.org/officeDocument/2006/relationships" xmlns:p="http://schemas.openxmlformats.org/presentationml/2006/main">
   <p:cSld>
+    <p:bg>
+      <p:bgPr>
+        <a:solidFill>
+          <a:schemeClr val="bg1"/>
+        </a:solidFill>
+        <a:effectLst/>
+      </p:bgPr>
+    </p:bg>
     <p:spTree>
       <p:nvGrpSpPr>
         <p:cNvPr id="1" name=""/>
@@ -5712,40 +5972,318 @@
             <p:ph type="title"/>
           </p:nvPr>
         </p:nvSpPr>
-        <p:spPr/>
-        <p:txBody>
-          <a:bodyPr/>
-          <a:lstStyle/>
+        <p:spPr>
+          <a:xfrm>
+            <a:off x="1136428" y="627564"/>
+            <a:ext cx="7474172" cy="1325563"/>
+          </a:xfrm>
+        </p:spPr>
+        <p:txBody>
+          <a:bodyPr>
+            <a:normAutofit/>
+          </a:bodyPr>
+          <a:lstStyle/>
+          <a:p>
+            <a:r>
+              <a:rPr lang="en-US" b="1" dirty="0"/>
+              <a:t>Conclusion</a:t>
+            </a:r>
+            <a:r>
+              <a:rPr lang="pl-PL" b="1" dirty="0"/>
+              <a:t>s</a:t>
+            </a:r>
+            <a:r>
+              <a:rPr lang="en-US" b="1" dirty="0"/>
+              <a:t>: </a:t>
+            </a:r>
+          </a:p>
+        </p:txBody>
+      </p:sp>
+      <p:sp>
+        <p:nvSpPr>
+          <p:cNvPr id="3" name="Content Placeholder 2">
+            <a:extLst>
+              <a:ext uri="{FF2B5EF4-FFF2-40B4-BE49-F238E27FC236}">
+                <a16:creationId xmlns:a16="http://schemas.microsoft.com/office/drawing/2014/main" id="{67859A24-94C2-4265-89E1-87B204C757A2}"/>
+              </a:ext>
+            </a:extLst>
+          </p:cNvPr>
+          <p:cNvSpPr>
+            <a:spLocks noGrp="1"/>
+          </p:cNvSpPr>
+          <p:nvPr>
+            <p:ph idx="1"/>
+          </p:nvPr>
+        </p:nvSpPr>
+        <p:spPr>
+          <a:xfrm>
+            <a:off x="1136428" y="1583175"/>
+            <a:ext cx="6467867" cy="2951747"/>
+          </a:xfrm>
+        </p:spPr>
+        <p:txBody>
+          <a:bodyPr anchor="ctr">
+            <a:normAutofit/>
+          </a:bodyPr>
+          <a:lstStyle/>
+          <a:p>
+            <a:r>
+              <a:rPr lang="pl-PL" sz="2400" dirty="0"/>
+              <a:t>Targeting a non-saturated </a:t>
+            </a:r>
+            <a:r>
+              <a:rPr lang="en-US" sz="2400" dirty="0"/>
+              <a:t>market in a state </a:t>
+            </a:r>
+            <a:r>
+              <a:rPr lang="pl-PL" sz="2400" dirty="0"/>
+              <a:t>with a strong </a:t>
+            </a:r>
+            <a:r>
+              <a:rPr lang="en-US" sz="2400" dirty="0"/>
+              <a:t>“brewing culture” is ideal. </a:t>
+            </a:r>
+          </a:p>
+          <a:p>
+            <a:r>
+              <a:rPr lang="en-US" sz="2400" dirty="0"/>
+              <a:t>IBU and ABV preferences vary by region, but have a strong center Hoppy Specter can target.</a:t>
+            </a:r>
+          </a:p>
+          <a:p>
+            <a:r>
+              <a:rPr lang="en-US" sz="2400" dirty="0"/>
+              <a:t>Brewing to a specific ABV range between 0.5 and 0.7 is likely to obtain the IBU value desired due to their strong correlation. </a:t>
+            </a:r>
+          </a:p>
+        </p:txBody>
+      </p:sp>
+      <p:sp>
+        <p:nvSpPr>
+          <p:cNvPr id="15" name="Rectangle 8">
+            <a:extLst>
+              <a:ext uri="{FF2B5EF4-FFF2-40B4-BE49-F238E27FC236}">
+                <a16:creationId xmlns:a16="http://schemas.microsoft.com/office/drawing/2014/main" id="{59A309A7-1751-4ABE-A3C1-EEC40366AD89}"/>
+              </a:ext>
+              <a:ext uri="{C183D7F6-B498-43B3-948B-1728B52AA6E4}">
+                <adec:decorative xmlns:adec="http://schemas.microsoft.com/office/drawing/2017/decorative" val="1"/>
+              </a:ext>
+            </a:extLst>
+          </p:cNvPr>
+          <p:cNvSpPr>
+            <a:spLocks noGrp="1" noRot="1" noChangeAspect="1" noMove="1" noResize="1" noEditPoints="1" noAdjustHandles="1" noChangeArrowheads="1" noChangeShapeType="1" noTextEdit="1"/>
+          </p:cNvSpPr>
+          <p:nvPr>
+            <p:extLst>
+              <p:ext uri="{386F3935-93C4-4BCD-93E2-E3B085C9AB24}">
+                <p16:designElem xmlns:p16="http://schemas.microsoft.com/office/powerpoint/2015/main" val="1"/>
+              </p:ext>
+            </p:extLst>
+          </p:nvPr>
+        </p:nvSpPr>
+        <p:spPr>
+          <a:xfrm>
+            <a:off x="10088880" y="0"/>
+            <a:ext cx="2103120" cy="6858000"/>
+          </a:xfrm>
+          <a:prstGeom prst="rect">
+            <a:avLst/>
+          </a:prstGeom>
+          <a:solidFill>
+            <a:srgbClr val="3A5977"/>
+          </a:solidFill>
+          <a:ln>
+            <a:noFill/>
+          </a:ln>
+        </p:spPr>
+        <p:style>
+          <a:lnRef idx="2">
+            <a:schemeClr val="accent1">
+              <a:shade val="50000"/>
+            </a:schemeClr>
+          </a:lnRef>
+          <a:fillRef idx="1">
+            <a:schemeClr val="accent1"/>
+          </a:fillRef>
+          <a:effectRef idx="0">
+            <a:schemeClr val="accent1"/>
+          </a:effectRef>
+          <a:fontRef idx="minor">
+            <a:schemeClr val="lt1"/>
+          </a:fontRef>
+        </p:style>
+        <p:txBody>
+          <a:bodyPr rtlCol="0" anchor="ctr"/>
+          <a:lstStyle/>
+          <a:p>
+            <a:pPr algn="ctr"/>
+            <a:endParaRPr lang="en-US"/>
+          </a:p>
+        </p:txBody>
+      </p:sp>
+      <p:sp>
+        <p:nvSpPr>
+          <p:cNvPr id="16" name="Oval 10">
+            <a:extLst>
+              <a:ext uri="{FF2B5EF4-FFF2-40B4-BE49-F238E27FC236}">
+                <a16:creationId xmlns:a16="http://schemas.microsoft.com/office/drawing/2014/main" id="{967D8EB6-EAE1-4F9C-B398-83321E287204}"/>
+              </a:ext>
+              <a:ext uri="{C183D7F6-B498-43B3-948B-1728B52AA6E4}">
+                <adec:decorative xmlns:adec="http://schemas.microsoft.com/office/drawing/2017/decorative" val="1"/>
+              </a:ext>
+            </a:extLst>
+          </p:cNvPr>
+          <p:cNvSpPr>
+            <a:spLocks noGrp="1" noRot="1" noChangeAspect="1" noMove="1" noResize="1" noEditPoints="1" noAdjustHandles="1" noChangeArrowheads="1" noChangeShapeType="1" noTextEdit="1"/>
+          </p:cNvSpPr>
+          <p:nvPr>
+            <p:extLst>
+              <p:ext uri="{386F3935-93C4-4BCD-93E2-E3B085C9AB24}">
+                <p16:designElem xmlns:p16="http://schemas.microsoft.com/office/powerpoint/2015/main" val="1"/>
+              </p:ext>
+            </p:extLst>
+          </p:nvPr>
+        </p:nvSpPr>
+        <p:spPr>
+          <a:xfrm>
+            <a:off x="8915400" y="2358913"/>
+            <a:ext cx="2140172" cy="2140172"/>
+          </a:xfrm>
+          <a:prstGeom prst="ellipse">
+            <a:avLst/>
+          </a:prstGeom>
+          <a:solidFill>
+            <a:srgbClr val="FFFFFF"/>
+          </a:solidFill>
+          <a:ln w="22225">
+            <a:solidFill>
+              <a:srgbClr val="FF3E00"/>
+            </a:solidFill>
+          </a:ln>
+        </p:spPr>
+        <p:style>
+          <a:lnRef idx="2">
+            <a:schemeClr val="accent1">
+              <a:shade val="50000"/>
+            </a:schemeClr>
+          </a:lnRef>
+          <a:fillRef idx="1">
+            <a:schemeClr val="accent1"/>
+          </a:fillRef>
+          <a:effectRef idx="0">
+            <a:schemeClr val="accent1"/>
+          </a:effectRef>
+          <a:fontRef idx="minor">
+            <a:schemeClr val="lt1"/>
+          </a:fontRef>
+        </p:style>
+        <p:txBody>
+          <a:bodyPr rtlCol="0" anchor="ctr"/>
+          <a:lstStyle/>
+          <a:p>
+            <a:pPr algn="ctr"/>
+            <a:endParaRPr lang="en-US"/>
+          </a:p>
+        </p:txBody>
+      </p:sp>
+      <p:pic>
+        <p:nvPicPr>
+          <p:cNvPr id="4" name="Picture 3">
+            <a:extLst>
+              <a:ext uri="{FF2B5EF4-FFF2-40B4-BE49-F238E27FC236}">
+                <a16:creationId xmlns:a16="http://schemas.microsoft.com/office/drawing/2014/main" id="{76D23762-2E8E-43F8-9E14-43D497232F15}"/>
+              </a:ext>
+            </a:extLst>
+          </p:cNvPr>
+          <p:cNvPicPr>
+            <a:picLocks noChangeAspect="1"/>
+          </p:cNvPicPr>
+          <p:nvPr/>
+        </p:nvPicPr>
+        <p:blipFill>
+          <a:blip r:embed="rId2"/>
+          <a:stretch>
+            <a:fillRect/>
+          </a:stretch>
+        </p:blipFill>
+        <p:spPr>
+          <a:xfrm>
+            <a:off x="9254442" y="3068655"/>
+            <a:ext cx="1462088" cy="720689"/>
+          </a:xfrm>
+          <a:prstGeom prst="rect">
+            <a:avLst/>
+          </a:prstGeom>
+        </p:spPr>
+      </p:pic>
+      <p:sp>
+        <p:nvSpPr>
+          <p:cNvPr id="5" name="TextBox 4">
+            <a:extLst>
+              <a:ext uri="{FF2B5EF4-FFF2-40B4-BE49-F238E27FC236}">
+                <a16:creationId xmlns:a16="http://schemas.microsoft.com/office/drawing/2014/main" id="{F735902A-E309-4094-814B-04B930687A58}"/>
+              </a:ext>
+            </a:extLst>
+          </p:cNvPr>
+          <p:cNvSpPr txBox="1"/>
+          <p:nvPr/>
+        </p:nvSpPr>
+        <p:spPr>
+          <a:xfrm>
+            <a:off x="585019" y="4565246"/>
+            <a:ext cx="8764721" cy="2015936"/>
+          </a:xfrm>
+          <a:prstGeom prst="rect">
+            <a:avLst/>
+          </a:prstGeom>
+          <a:solidFill>
+            <a:schemeClr val="accent1">
+              <a:lumMod val="20000"/>
+              <a:lumOff val="80000"/>
+            </a:schemeClr>
+          </a:solidFill>
+          <a:ln>
+            <a:solidFill>
+              <a:schemeClr val="tx1"/>
+            </a:solidFill>
+          </a:ln>
+        </p:spPr>
+        <p:txBody>
+          <a:bodyPr wrap="square" rtlCol="0">
+            <a:spAutoFit/>
+          </a:bodyPr>
+          <a:lstStyle/>
+          <a:p>
+            <a:r>
+              <a:rPr lang="en-US" sz="2400" b="1" dirty="0"/>
+              <a:t>Recommendation: </a:t>
+            </a:r>
+          </a:p>
+          <a:p>
+            <a:endParaRPr lang="en-US" sz="1100" b="1" dirty="0"/>
+          </a:p>
           <a:p>
             <a:r>
               <a:rPr lang="en-US" dirty="0"/>
-              <a:t>Conclusion: </a:t>
-            </a:r>
-          </a:p>
-        </p:txBody>
-      </p:sp>
-      <p:sp>
-        <p:nvSpPr>
-          <p:cNvPr id="3" name="Content Placeholder 2">
-            <a:extLst>
-              <a:ext uri="{FF2B5EF4-FFF2-40B4-BE49-F238E27FC236}">
-                <a16:creationId xmlns:a16="http://schemas.microsoft.com/office/drawing/2014/main" id="{67859A24-94C2-4265-89E1-87B204C757A2}"/>
-              </a:ext>
-            </a:extLst>
-          </p:cNvPr>
-          <p:cNvSpPr>
-            <a:spLocks noGrp="1"/>
-          </p:cNvSpPr>
-          <p:nvPr>
-            <p:ph idx="1"/>
-          </p:nvPr>
-        </p:nvSpPr>
-        <p:spPr/>
-        <p:txBody>
-          <a:bodyPr/>
-          <a:lstStyle/>
-          <a:p>
-            <a:endParaRPr lang="en-US"/>
+              <a:t>While a number of potential locations may be viable for the new “Pale as a Ghost” product, µ</a:t>
+            </a:r>
+            <a:r>
+              <a:rPr lang="en-US" dirty="0" err="1"/>
+              <a:t>nique</a:t>
+            </a:r>
+            <a:r>
+              <a:rPr lang="en-US" dirty="0"/>
+              <a:t> Data Consulting recommends Massachusetts as the primary launch location. </a:t>
+            </a:r>
+          </a:p>
+          <a:p>
+            <a:endParaRPr lang="en-US" dirty="0"/>
+          </a:p>
+          <a:p>
+            <a:r>
+              <a:rPr lang="en-US" dirty="0"/>
+              <a:t>Massachusetts offers a strong beer culture, aligned customer preference, and does not demonstrate the characteristics of a saturated market. </a:t>
+            </a:r>
           </a:p>
         </p:txBody>
       </p:sp>

</xml_diff>